<commit_message>
added comments to r script updated presentation
</commit_message>
<xml_diff>
--- a/presentations/lake_metabolism.pptx
+++ b/presentations/lake_metabolism.pptx
@@ -112,6 +112,11 @@
       </a:defRPr>
     </a:lvl9pPr>
   </p:defaultTextStyle>
+  <p:extLst>
+    <p:ext uri="{EFAFB233-063F-42B5-8137-9DF3F51BA10A}">
+      <p15:sldGuideLst xmlns:p15="http://schemas.microsoft.com/office/powerpoint/2012/main"/>
+    </p:ext>
+  </p:extLst>
 </p:presentation>
 </file>
 
@@ -5121,8 +5126,8 @@
           </a:p>
         </p:txBody>
       </p:sp>
-      <mc:AlternateContent xmlns:mc="http://schemas.openxmlformats.org/markup-compatibility/2006">
-        <mc:Choice xmlns:a14="http://schemas.microsoft.com/office/drawing/2010/main" Requires="a14">
+      <mc:AlternateContent xmlns:mc="http://schemas.openxmlformats.org/markup-compatibility/2006" xmlns:a14="http://schemas.microsoft.com/office/drawing/2010/main">
+        <mc:Choice Requires="a14">
           <p:sp>
             <p:nvSpPr>
               <p:cNvPr id="4" name="TextBox 3">
@@ -5591,7 +5596,7 @@
             </p:txBody>
           </p:sp>
         </mc:Choice>
-        <mc:Fallback>
+        <mc:Fallback xmlns="">
           <p:sp>
             <p:nvSpPr>
               <p:cNvPr id="4" name="TextBox 3">
@@ -5636,8 +5641,8 @@
           </p:sp>
         </mc:Fallback>
       </mc:AlternateContent>
-      <mc:AlternateContent xmlns:mc="http://schemas.openxmlformats.org/markup-compatibility/2006">
-        <mc:Choice xmlns:a14="http://schemas.microsoft.com/office/drawing/2010/main" Requires="a14">
+      <mc:AlternateContent xmlns:mc="http://schemas.openxmlformats.org/markup-compatibility/2006" xmlns:a14="http://schemas.microsoft.com/office/drawing/2010/main">
+        <mc:Choice Requires="a14">
           <p:sp>
             <p:nvSpPr>
               <p:cNvPr id="5" name="TextBox 4">
@@ -6100,7 +6105,7 @@
             </p:txBody>
           </p:sp>
         </mc:Choice>
-        <mc:Fallback>
+        <mc:Fallback xmlns="">
           <p:sp>
             <p:nvSpPr>
               <p:cNvPr id="5" name="TextBox 4">
@@ -6586,7 +6591,15 @@
           <a:p>
             <a:r>
               <a:rPr lang="en-US" sz="3600" dirty="0"/>
-              <a:t>But…we aren’t measuring O2 or DIC</a:t>
+              <a:t>But…we aren’t measuring O</a:t>
+            </a:r>
+            <a:r>
+              <a:rPr lang="en-US" sz="3600" baseline="-25000" dirty="0"/>
+              <a:t>2</a:t>
+            </a:r>
+            <a:r>
+              <a:rPr lang="en-US" sz="3600" dirty="0"/>
+              <a:t> or DIC</a:t>
             </a:r>
           </a:p>
         </p:txBody>

</xml_diff>